<commit_message>
Lect 5.2: Function arg passing
</commit_message>
<xml_diff>
--- a/Lecture5/Teaching Presentation.pptx
+++ b/Lecture5/Teaching Presentation.pptx
@@ -13,6 +13,11 @@
     <p:sldId id="263" r:id="rId7"/>
     <p:sldId id="264" r:id="rId8"/>
     <p:sldId id="260" r:id="rId9"/>
+    <p:sldId id="265" r:id="rId10"/>
+    <p:sldId id="266" r:id="rId11"/>
+    <p:sldId id="267" r:id="rId12"/>
+    <p:sldId id="268" r:id="rId13"/>
+    <p:sldId id="269" r:id="rId14"/>
   </p:sldIdLst>
   <p:sldSz cx="12192000" cy="6858000"/>
   <p:notesSz cx="6858000" cy="9144000"/>
@@ -305,7 +310,7 @@
           <a:p>
             <a:fld id="{1D0B46A9-FA61-44B1-8511-267E0DE57512}" type="datetimeFigureOut">
               <a:rPr lang="en-IN" smtClean="0"/>
-              <a:t>07-04-2020</a:t>
+              <a:t>08-04-2020</a:t>
             </a:fld>
             <a:endParaRPr lang="en-IN"/>
           </a:p>
@@ -580,7 +585,7 @@
           <a:p>
             <a:fld id="{1D0B46A9-FA61-44B1-8511-267E0DE57512}" type="datetimeFigureOut">
               <a:rPr lang="en-IN" smtClean="0"/>
-              <a:t>07-04-2020</a:t>
+              <a:t>08-04-2020</a:t>
             </a:fld>
             <a:endParaRPr lang="en-IN"/>
           </a:p>
@@ -774,7 +779,7 @@
           <a:p>
             <a:fld id="{1D0B46A9-FA61-44B1-8511-267E0DE57512}" type="datetimeFigureOut">
               <a:rPr lang="en-IN" smtClean="0"/>
-              <a:t>07-04-2020</a:t>
+              <a:t>08-04-2020</a:t>
             </a:fld>
             <a:endParaRPr lang="en-IN"/>
           </a:p>
@@ -1047,7 +1052,7 @@
           <a:p>
             <a:fld id="{1D0B46A9-FA61-44B1-8511-267E0DE57512}" type="datetimeFigureOut">
               <a:rPr lang="en-IN" smtClean="0"/>
-              <a:t>07-04-2020</a:t>
+              <a:t>08-04-2020</a:t>
             </a:fld>
             <a:endParaRPr lang="en-IN"/>
           </a:p>
@@ -1388,7 +1393,7 @@
           <a:p>
             <a:fld id="{1D0B46A9-FA61-44B1-8511-267E0DE57512}" type="datetimeFigureOut">
               <a:rPr lang="en-IN" smtClean="0"/>
-              <a:t>07-04-2020</a:t>
+              <a:t>08-04-2020</a:t>
             </a:fld>
             <a:endParaRPr lang="en-IN"/>
           </a:p>
@@ -2011,7 +2016,7 @@
           <a:p>
             <a:fld id="{1D0B46A9-FA61-44B1-8511-267E0DE57512}" type="datetimeFigureOut">
               <a:rPr lang="en-IN" smtClean="0"/>
-              <a:t>07-04-2020</a:t>
+              <a:t>08-04-2020</a:t>
             </a:fld>
             <a:endParaRPr lang="en-IN"/>
           </a:p>
@@ -2871,7 +2876,7 @@
           <a:p>
             <a:fld id="{1D0B46A9-FA61-44B1-8511-267E0DE57512}" type="datetimeFigureOut">
               <a:rPr lang="en-IN" smtClean="0"/>
-              <a:t>07-04-2020</a:t>
+              <a:t>08-04-2020</a:t>
             </a:fld>
             <a:endParaRPr lang="en-IN"/>
           </a:p>
@@ -3041,7 +3046,7 @@
           <a:p>
             <a:fld id="{1D0B46A9-FA61-44B1-8511-267E0DE57512}" type="datetimeFigureOut">
               <a:rPr lang="en-IN" smtClean="0"/>
-              <a:t>07-04-2020</a:t>
+              <a:t>08-04-2020</a:t>
             </a:fld>
             <a:endParaRPr lang="en-IN"/>
           </a:p>
@@ -3221,7 +3226,7 @@
           <a:p>
             <a:fld id="{1D0B46A9-FA61-44B1-8511-267E0DE57512}" type="datetimeFigureOut">
               <a:rPr lang="en-IN" smtClean="0"/>
-              <a:t>07-04-2020</a:t>
+              <a:t>08-04-2020</a:t>
             </a:fld>
             <a:endParaRPr lang="en-IN"/>
           </a:p>
@@ -3391,7 +3396,7 @@
           <a:p>
             <a:fld id="{1D0B46A9-FA61-44B1-8511-267E0DE57512}" type="datetimeFigureOut">
               <a:rPr lang="en-IN" smtClean="0"/>
-              <a:t>07-04-2020</a:t>
+              <a:t>08-04-2020</a:t>
             </a:fld>
             <a:endParaRPr lang="en-IN"/>
           </a:p>
@@ -3638,7 +3643,7 @@
           <a:p>
             <a:fld id="{1D0B46A9-FA61-44B1-8511-267E0DE57512}" type="datetimeFigureOut">
               <a:rPr lang="en-IN" smtClean="0"/>
-              <a:t>07-04-2020</a:t>
+              <a:t>08-04-2020</a:t>
             </a:fld>
             <a:endParaRPr lang="en-IN"/>
           </a:p>
@@ -3930,7 +3935,7 @@
           <a:p>
             <a:fld id="{1D0B46A9-FA61-44B1-8511-267E0DE57512}" type="datetimeFigureOut">
               <a:rPr lang="en-IN" smtClean="0"/>
-              <a:t>07-04-2020</a:t>
+              <a:t>08-04-2020</a:t>
             </a:fld>
             <a:endParaRPr lang="en-IN"/>
           </a:p>
@@ -4374,7 +4379,7 @@
           <a:p>
             <a:fld id="{1D0B46A9-FA61-44B1-8511-267E0DE57512}" type="datetimeFigureOut">
               <a:rPr lang="en-IN" smtClean="0"/>
-              <a:t>07-04-2020</a:t>
+              <a:t>08-04-2020</a:t>
             </a:fld>
             <a:endParaRPr lang="en-IN"/>
           </a:p>
@@ -4492,7 +4497,7 @@
           <a:p>
             <a:fld id="{1D0B46A9-FA61-44B1-8511-267E0DE57512}" type="datetimeFigureOut">
               <a:rPr lang="en-IN" smtClean="0"/>
-              <a:t>07-04-2020</a:t>
+              <a:t>08-04-2020</a:t>
             </a:fld>
             <a:endParaRPr lang="en-IN"/>
           </a:p>
@@ -4587,7 +4592,7 @@
           <a:p>
             <a:fld id="{1D0B46A9-FA61-44B1-8511-267E0DE57512}" type="datetimeFigureOut">
               <a:rPr lang="en-IN" smtClean="0"/>
-              <a:t>07-04-2020</a:t>
+              <a:t>08-04-2020</a:t>
             </a:fld>
             <a:endParaRPr lang="en-IN"/>
           </a:p>
@@ -4866,7 +4871,7 @@
           <a:p>
             <a:fld id="{1D0B46A9-FA61-44B1-8511-267E0DE57512}" type="datetimeFigureOut">
               <a:rPr lang="en-IN" smtClean="0"/>
-              <a:t>07-04-2020</a:t>
+              <a:t>08-04-2020</a:t>
             </a:fld>
             <a:endParaRPr lang="en-IN"/>
           </a:p>
@@ -5141,7 +5146,7 @@
           <a:p>
             <a:fld id="{1D0B46A9-FA61-44B1-8511-267E0DE57512}" type="datetimeFigureOut">
               <a:rPr lang="en-IN" smtClean="0"/>
-              <a:t>07-04-2020</a:t>
+              <a:t>08-04-2020</a:t>
             </a:fld>
             <a:endParaRPr lang="en-IN"/>
           </a:p>
@@ -5570,7 +5575,7 @@
           <a:p>
             <a:fld id="{1D0B46A9-FA61-44B1-8511-267E0DE57512}" type="datetimeFigureOut">
               <a:rPr lang="en-IN" smtClean="0"/>
-              <a:t>07-04-2020</a:t>
+              <a:t>08-04-2020</a:t>
             </a:fld>
             <a:endParaRPr lang="en-IN"/>
           </a:p>
@@ -6284,6 +6289,1770 @@
 </p:sld>
 </file>
 
+<file path=ppt/slides/slide10.xml><?xml version="1.0" encoding="utf-8"?>
+<p:sld xmlns:a="http://schemas.openxmlformats.org/drawingml/2006/main" xmlns:r="http://schemas.openxmlformats.org/officeDocument/2006/relationships" xmlns:p="http://schemas.openxmlformats.org/presentationml/2006/main">
+  <p:cSld>
+    <p:spTree>
+      <p:nvGrpSpPr>
+        <p:cNvPr id="1" name=""/>
+        <p:cNvGrpSpPr/>
+        <p:nvPr/>
+      </p:nvGrpSpPr>
+      <p:grpSpPr>
+        <a:xfrm>
+          <a:off x="0" y="0"/>
+          <a:ext cx="0" cy="0"/>
+          <a:chOff x="0" y="0"/>
+          <a:chExt cx="0" cy="0"/>
+        </a:xfrm>
+      </p:grpSpPr>
+      <p:sp>
+        <p:nvSpPr>
+          <p:cNvPr id="2" name="Title 1"/>
+          <p:cNvSpPr>
+            <a:spLocks noGrp="1"/>
+          </p:cNvSpPr>
+          <p:nvPr>
+            <p:ph type="title"/>
+          </p:nvPr>
+        </p:nvSpPr>
+        <p:spPr>
+          <a:xfrm>
+            <a:off x="646111" y="452718"/>
+            <a:ext cx="10035744" cy="1400530"/>
+          </a:xfrm>
+        </p:spPr>
+        <p:txBody>
+          <a:bodyPr/>
+          <a:lstStyle/>
+          <a:p>
+            <a:r>
+              <a:rPr lang="en-US" dirty="0" smtClean="0"/>
+              <a:t>Pass by reference and Pass by value</a:t>
+            </a:r>
+            <a:endParaRPr lang="en-IN" dirty="0"/>
+          </a:p>
+        </p:txBody>
+      </p:sp>
+      <p:sp>
+        <p:nvSpPr>
+          <p:cNvPr id="4" name="Rectangle 3"/>
+          <p:cNvSpPr/>
+          <p:nvPr/>
+        </p:nvSpPr>
+        <p:spPr>
+          <a:xfrm>
+            <a:off x="928255" y="1853248"/>
+            <a:ext cx="4128654" cy="2123007"/>
+          </a:xfrm>
+          <a:prstGeom prst="rect">
+            <a:avLst/>
+          </a:prstGeom>
+          <a:solidFill>
+            <a:srgbClr val="0070C0"/>
+          </a:solidFill>
+        </p:spPr>
+        <p:style>
+          <a:lnRef idx="2">
+            <a:schemeClr val="accent1">
+              <a:shade val="50000"/>
+            </a:schemeClr>
+          </a:lnRef>
+          <a:fillRef idx="1">
+            <a:schemeClr val="accent1"/>
+          </a:fillRef>
+          <a:effectRef idx="0">
+            <a:schemeClr val="accent1"/>
+          </a:effectRef>
+          <a:fontRef idx="minor">
+            <a:schemeClr val="lt1"/>
+          </a:fontRef>
+        </p:style>
+        <p:txBody>
+          <a:bodyPr rtlCol="0" anchor="t"/>
+          <a:lstStyle/>
+          <a:p>
+            <a:r>
+              <a:rPr lang="en-US" sz="2400" b="1" dirty="0" err="1">
+                <a:solidFill>
+                  <a:srgbClr val="FFFF00"/>
+                </a:solidFill>
+              </a:rPr>
+              <a:t>d</a:t>
+            </a:r>
+            <a:r>
+              <a:rPr lang="en-US" sz="2400" b="1" dirty="0" err="1" smtClean="0">
+                <a:solidFill>
+                  <a:srgbClr val="FFFF00"/>
+                </a:solidFill>
+              </a:rPr>
+              <a:t>ef</a:t>
+            </a:r>
+            <a:r>
+              <a:rPr lang="en-US" sz="2400" b="1" dirty="0" smtClean="0">
+                <a:solidFill>
+                  <a:srgbClr val="FFFF00"/>
+                </a:solidFill>
+              </a:rPr>
+              <a:t> func1(arg1, arg2, ….)</a:t>
+            </a:r>
+          </a:p>
+          <a:p>
+            <a:r>
+              <a:rPr lang="en-US" sz="2400" b="1" dirty="0" smtClean="0">
+                <a:solidFill>
+                  <a:srgbClr val="FFFF00"/>
+                </a:solidFill>
+              </a:rPr>
+              <a:t>	……..</a:t>
+            </a:r>
+          </a:p>
+          <a:p>
+            <a:r>
+              <a:rPr lang="en-US" sz="2400" b="1" dirty="0" smtClean="0">
+                <a:solidFill>
+                  <a:srgbClr val="FFFF00"/>
+                </a:solidFill>
+              </a:rPr>
+              <a:t>	……..</a:t>
+            </a:r>
+            <a:endParaRPr lang="en-IN" sz="2400" b="1" dirty="0">
+              <a:solidFill>
+                <a:srgbClr val="FFFF00"/>
+              </a:solidFill>
+            </a:endParaRPr>
+          </a:p>
+        </p:txBody>
+      </p:sp>
+      <p:sp>
+        <p:nvSpPr>
+          <p:cNvPr id="5" name="Rectangle 4"/>
+          <p:cNvSpPr/>
+          <p:nvPr/>
+        </p:nvSpPr>
+        <p:spPr>
+          <a:xfrm>
+            <a:off x="8298873" y="1853248"/>
+            <a:ext cx="2895600" cy="3685309"/>
+          </a:xfrm>
+          <a:prstGeom prst="rect">
+            <a:avLst/>
+          </a:prstGeom>
+          <a:solidFill>
+            <a:srgbClr val="00B0F0"/>
+          </a:solidFill>
+        </p:spPr>
+        <p:style>
+          <a:lnRef idx="2">
+            <a:schemeClr val="accent1">
+              <a:shade val="50000"/>
+            </a:schemeClr>
+          </a:lnRef>
+          <a:fillRef idx="1">
+            <a:schemeClr val="accent1"/>
+          </a:fillRef>
+          <a:effectRef idx="0">
+            <a:schemeClr val="accent1"/>
+          </a:effectRef>
+          <a:fontRef idx="minor">
+            <a:schemeClr val="lt1"/>
+          </a:fontRef>
+        </p:style>
+        <p:txBody>
+          <a:bodyPr rtlCol="0" anchor="ctr"/>
+          <a:lstStyle/>
+          <a:p>
+            <a:r>
+              <a:rPr lang="en-US" sz="2400" b="1" dirty="0" smtClean="0"/>
+              <a:t>………..</a:t>
+            </a:r>
+          </a:p>
+          <a:p>
+            <a:r>
+              <a:rPr lang="en-US" sz="2400" b="1" dirty="0" smtClean="0"/>
+              <a:t>………..</a:t>
+            </a:r>
+          </a:p>
+          <a:p>
+            <a:r>
+              <a:rPr lang="en-US" sz="2400" b="1" dirty="0" smtClean="0"/>
+              <a:t>func1(x, y, ….)</a:t>
+            </a:r>
+            <a:endParaRPr lang="en-IN" sz="2400" b="1" dirty="0"/>
+          </a:p>
+        </p:txBody>
+      </p:sp>
+      <p:cxnSp>
+        <p:nvCxnSpPr>
+          <p:cNvPr id="9" name="Straight Arrow Connector 8"/>
+          <p:cNvCxnSpPr/>
+          <p:nvPr/>
+        </p:nvCxnSpPr>
+        <p:spPr>
+          <a:xfrm flipV="1">
+            <a:off x="3334428" y="1377404"/>
+            <a:ext cx="1371600" cy="471055"/>
+          </a:xfrm>
+          <a:prstGeom prst="straightConnector1">
+            <a:avLst/>
+          </a:prstGeom>
+          <a:ln w="38100">
+            <a:solidFill>
+              <a:schemeClr val="tx1"/>
+            </a:solidFill>
+            <a:tailEnd type="triangle"/>
+          </a:ln>
+        </p:spPr>
+        <p:style>
+          <a:lnRef idx="1">
+            <a:schemeClr val="accent1"/>
+          </a:lnRef>
+          <a:fillRef idx="0">
+            <a:schemeClr val="accent1"/>
+          </a:fillRef>
+          <a:effectRef idx="0">
+            <a:schemeClr val="accent1"/>
+          </a:effectRef>
+          <a:fontRef idx="minor">
+            <a:schemeClr val="tx1"/>
+          </a:fontRef>
+        </p:style>
+      </p:cxnSp>
+      <p:cxnSp>
+        <p:nvCxnSpPr>
+          <p:cNvPr id="10" name="Straight Arrow Connector 9"/>
+          <p:cNvCxnSpPr>
+            <a:endCxn id="13" idx="3"/>
+          </p:cNvCxnSpPr>
+          <p:nvPr/>
+        </p:nvCxnSpPr>
+        <p:spPr>
+          <a:xfrm flipH="1" flipV="1">
+            <a:off x="7370850" y="4097647"/>
+            <a:ext cx="914169" cy="9484"/>
+          </a:xfrm>
+          <a:prstGeom prst="straightConnector1">
+            <a:avLst/>
+          </a:prstGeom>
+          <a:ln w="38100">
+            <a:solidFill>
+              <a:schemeClr val="tx1"/>
+            </a:solidFill>
+            <a:tailEnd type="triangle"/>
+          </a:ln>
+        </p:spPr>
+        <p:style>
+          <a:lnRef idx="1">
+            <a:schemeClr val="accent1"/>
+          </a:lnRef>
+          <a:fillRef idx="0">
+            <a:schemeClr val="accent1"/>
+          </a:fillRef>
+          <a:effectRef idx="0">
+            <a:schemeClr val="accent1"/>
+          </a:effectRef>
+          <a:fontRef idx="minor">
+            <a:schemeClr val="tx1"/>
+          </a:fontRef>
+        </p:style>
+      </p:cxnSp>
+      <p:sp>
+        <p:nvSpPr>
+          <p:cNvPr id="12" name="TextBox 11"/>
+          <p:cNvSpPr txBox="1"/>
+          <p:nvPr/>
+        </p:nvSpPr>
+        <p:spPr>
+          <a:xfrm>
+            <a:off x="4820078" y="1242046"/>
+            <a:ext cx="1915909" cy="369332"/>
+          </a:xfrm>
+          <a:prstGeom prst="rect">
+            <a:avLst/>
+          </a:prstGeom>
+          <a:noFill/>
+        </p:spPr>
+        <p:txBody>
+          <a:bodyPr wrap="none" rtlCol="0">
+            <a:spAutoFit/>
+          </a:bodyPr>
+          <a:lstStyle/>
+          <a:p>
+            <a:r>
+              <a:rPr lang="en-US" dirty="0" smtClean="0"/>
+              <a:t>Called function</a:t>
+            </a:r>
+            <a:endParaRPr lang="en-IN" dirty="0"/>
+          </a:p>
+        </p:txBody>
+      </p:sp>
+      <p:sp>
+        <p:nvSpPr>
+          <p:cNvPr id="13" name="TextBox 12"/>
+          <p:cNvSpPr txBox="1"/>
+          <p:nvPr/>
+        </p:nvSpPr>
+        <p:spPr>
+          <a:xfrm>
+            <a:off x="4927552" y="3912981"/>
+            <a:ext cx="2443298" cy="369332"/>
+          </a:xfrm>
+          <a:prstGeom prst="rect">
+            <a:avLst/>
+          </a:prstGeom>
+          <a:noFill/>
+        </p:spPr>
+        <p:txBody>
+          <a:bodyPr wrap="none" rtlCol="0">
+            <a:spAutoFit/>
+          </a:bodyPr>
+          <a:lstStyle/>
+          <a:p>
+            <a:r>
+              <a:rPr lang="en-US" dirty="0" smtClean="0"/>
+              <a:t>Calling environment</a:t>
+            </a:r>
+            <a:endParaRPr lang="en-IN" dirty="0"/>
+          </a:p>
+        </p:txBody>
+      </p:sp>
+      <p:cxnSp>
+        <p:nvCxnSpPr>
+          <p:cNvPr id="14" name="Straight Arrow Connector 13"/>
+          <p:cNvCxnSpPr>
+            <a:endCxn id="17" idx="1"/>
+          </p:cNvCxnSpPr>
+          <p:nvPr/>
+        </p:nvCxnSpPr>
+        <p:spPr>
+          <a:xfrm>
+            <a:off x="3592576" y="2316698"/>
+            <a:ext cx="1841869" cy="292973"/>
+          </a:xfrm>
+          <a:prstGeom prst="straightConnector1">
+            <a:avLst/>
+          </a:prstGeom>
+          <a:ln w="38100">
+            <a:solidFill>
+              <a:schemeClr val="tx1"/>
+            </a:solidFill>
+            <a:tailEnd type="triangle"/>
+          </a:ln>
+        </p:spPr>
+        <p:style>
+          <a:lnRef idx="1">
+            <a:schemeClr val="accent1"/>
+          </a:lnRef>
+          <a:fillRef idx="0">
+            <a:schemeClr val="accent1"/>
+          </a:fillRef>
+          <a:effectRef idx="0">
+            <a:schemeClr val="accent1"/>
+          </a:effectRef>
+          <a:fontRef idx="minor">
+            <a:schemeClr val="tx1"/>
+          </a:fontRef>
+        </p:style>
+      </p:cxnSp>
+      <p:sp>
+        <p:nvSpPr>
+          <p:cNvPr id="17" name="TextBox 16"/>
+          <p:cNvSpPr txBox="1"/>
+          <p:nvPr/>
+        </p:nvSpPr>
+        <p:spPr>
+          <a:xfrm>
+            <a:off x="5434445" y="2425005"/>
+            <a:ext cx="2199641" cy="369332"/>
+          </a:xfrm>
+          <a:prstGeom prst="rect">
+            <a:avLst/>
+          </a:prstGeom>
+          <a:noFill/>
+        </p:spPr>
+        <p:txBody>
+          <a:bodyPr wrap="none" rtlCol="0">
+            <a:spAutoFit/>
+          </a:bodyPr>
+          <a:lstStyle/>
+          <a:p>
+            <a:r>
+              <a:rPr lang="en-US" dirty="0" smtClean="0"/>
+              <a:t>Formal arguments</a:t>
+            </a:r>
+            <a:endParaRPr lang="en-IN" dirty="0"/>
+          </a:p>
+        </p:txBody>
+      </p:sp>
+      <p:cxnSp>
+        <p:nvCxnSpPr>
+          <p:cNvPr id="18" name="Straight Arrow Connector 17"/>
+          <p:cNvCxnSpPr/>
+          <p:nvPr/>
+        </p:nvCxnSpPr>
+        <p:spPr>
+          <a:xfrm flipH="1">
+            <a:off x="7329055" y="4295924"/>
+            <a:ext cx="2543325" cy="553167"/>
+          </a:xfrm>
+          <a:prstGeom prst="straightConnector1">
+            <a:avLst/>
+          </a:prstGeom>
+          <a:ln w="38100">
+            <a:solidFill>
+              <a:schemeClr val="tx1"/>
+            </a:solidFill>
+            <a:tailEnd type="triangle"/>
+          </a:ln>
+        </p:spPr>
+        <p:style>
+          <a:lnRef idx="1">
+            <a:schemeClr val="accent1"/>
+          </a:lnRef>
+          <a:fillRef idx="0">
+            <a:schemeClr val="accent1"/>
+          </a:fillRef>
+          <a:effectRef idx="0">
+            <a:schemeClr val="accent1"/>
+          </a:effectRef>
+          <a:fontRef idx="minor">
+            <a:schemeClr val="tx1"/>
+          </a:fontRef>
+        </p:style>
+      </p:cxnSp>
+      <p:sp>
+        <p:nvSpPr>
+          <p:cNvPr id="20" name="TextBox 19"/>
+          <p:cNvSpPr txBox="1"/>
+          <p:nvPr/>
+        </p:nvSpPr>
+        <p:spPr>
+          <a:xfrm>
+            <a:off x="5855575" y="4876313"/>
+            <a:ext cx="2191626" cy="369332"/>
+          </a:xfrm>
+          <a:prstGeom prst="rect">
+            <a:avLst/>
+          </a:prstGeom>
+          <a:noFill/>
+        </p:spPr>
+        <p:txBody>
+          <a:bodyPr wrap="none" rtlCol="0">
+            <a:spAutoFit/>
+          </a:bodyPr>
+          <a:lstStyle/>
+          <a:p>
+            <a:r>
+              <a:rPr lang="en-US" dirty="0" smtClean="0"/>
+              <a:t>Actual arguments</a:t>
+            </a:r>
+            <a:endParaRPr lang="en-IN" dirty="0"/>
+          </a:p>
+        </p:txBody>
+      </p:sp>
+      <p:cxnSp>
+        <p:nvCxnSpPr>
+          <p:cNvPr id="22" name="Straight Arrow Connector 21"/>
+          <p:cNvCxnSpPr/>
+          <p:nvPr/>
+        </p:nvCxnSpPr>
+        <p:spPr>
+          <a:xfrm>
+            <a:off x="3158836" y="2314724"/>
+            <a:ext cx="6359237" cy="1564549"/>
+          </a:xfrm>
+          <a:prstGeom prst="straightConnector1">
+            <a:avLst/>
+          </a:prstGeom>
+          <a:ln w="38100">
+            <a:headEnd type="triangle"/>
+            <a:tailEnd type="triangle"/>
+          </a:ln>
+        </p:spPr>
+        <p:style>
+          <a:lnRef idx="1">
+            <a:schemeClr val="accent1"/>
+          </a:lnRef>
+          <a:fillRef idx="0">
+            <a:schemeClr val="accent1"/>
+          </a:fillRef>
+          <a:effectRef idx="0">
+            <a:schemeClr val="accent1"/>
+          </a:effectRef>
+          <a:fontRef idx="minor">
+            <a:schemeClr val="tx1"/>
+          </a:fontRef>
+        </p:style>
+      </p:cxnSp>
+    </p:spTree>
+    <p:extLst>
+      <p:ext uri="{BB962C8B-B14F-4D97-AF65-F5344CB8AC3E}">
+        <p14:creationId xmlns:p14="http://schemas.microsoft.com/office/powerpoint/2010/main" val="3018318470"/>
+      </p:ext>
+    </p:extLst>
+  </p:cSld>
+  <p:clrMapOvr>
+    <a:masterClrMapping/>
+  </p:clrMapOvr>
+  <p:timing>
+    <p:tnLst>
+      <p:par>
+        <p:cTn id="1" dur="indefinite" restart="never" nodeType="tmRoot"/>
+      </p:par>
+    </p:tnLst>
+  </p:timing>
+</p:sld>
+</file>
+
+<file path=ppt/slides/slide11.xml><?xml version="1.0" encoding="utf-8"?>
+<p:sld xmlns:a="http://schemas.openxmlformats.org/drawingml/2006/main" xmlns:r="http://schemas.openxmlformats.org/officeDocument/2006/relationships" xmlns:p="http://schemas.openxmlformats.org/presentationml/2006/main">
+  <p:cSld>
+    <p:spTree>
+      <p:nvGrpSpPr>
+        <p:cNvPr id="1" name=""/>
+        <p:cNvGrpSpPr/>
+        <p:nvPr/>
+      </p:nvGrpSpPr>
+      <p:grpSpPr>
+        <a:xfrm>
+          <a:off x="0" y="0"/>
+          <a:ext cx="0" cy="0"/>
+          <a:chOff x="0" y="0"/>
+          <a:chExt cx="0" cy="0"/>
+        </a:xfrm>
+      </p:grpSpPr>
+      <p:sp>
+        <p:nvSpPr>
+          <p:cNvPr id="2" name="Title 1"/>
+          <p:cNvSpPr>
+            <a:spLocks noGrp="1"/>
+          </p:cNvSpPr>
+          <p:nvPr>
+            <p:ph type="title"/>
+          </p:nvPr>
+        </p:nvSpPr>
+        <p:spPr>
+          <a:xfrm>
+            <a:off x="646111" y="452718"/>
+            <a:ext cx="10035744" cy="1400530"/>
+          </a:xfrm>
+        </p:spPr>
+        <p:txBody>
+          <a:bodyPr/>
+          <a:lstStyle/>
+          <a:p>
+            <a:r>
+              <a:rPr lang="en-US" dirty="0" smtClean="0"/>
+              <a:t>Pass by reference</a:t>
+            </a:r>
+            <a:endParaRPr lang="en-IN" dirty="0"/>
+          </a:p>
+        </p:txBody>
+      </p:sp>
+      <p:sp>
+        <p:nvSpPr>
+          <p:cNvPr id="4" name="Rectangle 3"/>
+          <p:cNvSpPr/>
+          <p:nvPr/>
+        </p:nvSpPr>
+        <p:spPr>
+          <a:xfrm>
+            <a:off x="928255" y="1853248"/>
+            <a:ext cx="4128654" cy="2123007"/>
+          </a:xfrm>
+          <a:prstGeom prst="rect">
+            <a:avLst/>
+          </a:prstGeom>
+          <a:solidFill>
+            <a:srgbClr val="0070C0"/>
+          </a:solidFill>
+        </p:spPr>
+        <p:style>
+          <a:lnRef idx="2">
+            <a:schemeClr val="accent1">
+              <a:shade val="50000"/>
+            </a:schemeClr>
+          </a:lnRef>
+          <a:fillRef idx="1">
+            <a:schemeClr val="accent1"/>
+          </a:fillRef>
+          <a:effectRef idx="0">
+            <a:schemeClr val="accent1"/>
+          </a:effectRef>
+          <a:fontRef idx="minor">
+            <a:schemeClr val="lt1"/>
+          </a:fontRef>
+        </p:style>
+        <p:txBody>
+          <a:bodyPr rtlCol="0" anchor="t"/>
+          <a:lstStyle/>
+          <a:p>
+            <a:r>
+              <a:rPr lang="en-US" sz="2400" b="1" dirty="0" err="1">
+                <a:solidFill>
+                  <a:srgbClr val="FFFF00"/>
+                </a:solidFill>
+              </a:rPr>
+              <a:t>d</a:t>
+            </a:r>
+            <a:r>
+              <a:rPr lang="en-US" sz="2400" b="1" dirty="0" err="1" smtClean="0">
+                <a:solidFill>
+                  <a:srgbClr val="FFFF00"/>
+                </a:solidFill>
+              </a:rPr>
+              <a:t>ef</a:t>
+            </a:r>
+            <a:r>
+              <a:rPr lang="en-US" sz="2400" b="1" dirty="0" smtClean="0">
+                <a:solidFill>
+                  <a:srgbClr val="FFFF00"/>
+                </a:solidFill>
+              </a:rPr>
+              <a:t> func1(arg1, arg2, ….)</a:t>
+            </a:r>
+          </a:p>
+          <a:p>
+            <a:r>
+              <a:rPr lang="en-US" sz="2400" b="1" dirty="0" smtClean="0">
+                <a:solidFill>
+                  <a:srgbClr val="FFFF00"/>
+                </a:solidFill>
+              </a:rPr>
+              <a:t>	……..</a:t>
+            </a:r>
+          </a:p>
+          <a:p>
+            <a:r>
+              <a:rPr lang="en-US" sz="2400" b="1" dirty="0" smtClean="0">
+                <a:solidFill>
+                  <a:srgbClr val="FFFF00"/>
+                </a:solidFill>
+              </a:rPr>
+              <a:t>	……..</a:t>
+            </a:r>
+            <a:endParaRPr lang="en-IN" sz="2400" b="1" dirty="0">
+              <a:solidFill>
+                <a:srgbClr val="FFFF00"/>
+              </a:solidFill>
+            </a:endParaRPr>
+          </a:p>
+        </p:txBody>
+      </p:sp>
+      <p:sp>
+        <p:nvSpPr>
+          <p:cNvPr id="5" name="Rectangle 4"/>
+          <p:cNvSpPr/>
+          <p:nvPr/>
+        </p:nvSpPr>
+        <p:spPr>
+          <a:xfrm>
+            <a:off x="8298873" y="1853248"/>
+            <a:ext cx="2895600" cy="3685309"/>
+          </a:xfrm>
+          <a:prstGeom prst="rect">
+            <a:avLst/>
+          </a:prstGeom>
+          <a:solidFill>
+            <a:srgbClr val="00B0F0"/>
+          </a:solidFill>
+        </p:spPr>
+        <p:style>
+          <a:lnRef idx="2">
+            <a:schemeClr val="accent1">
+              <a:shade val="50000"/>
+            </a:schemeClr>
+          </a:lnRef>
+          <a:fillRef idx="1">
+            <a:schemeClr val="accent1"/>
+          </a:fillRef>
+          <a:effectRef idx="0">
+            <a:schemeClr val="accent1"/>
+          </a:effectRef>
+          <a:fontRef idx="minor">
+            <a:schemeClr val="lt1"/>
+          </a:fontRef>
+        </p:style>
+        <p:txBody>
+          <a:bodyPr rtlCol="0" anchor="ctr"/>
+          <a:lstStyle/>
+          <a:p>
+            <a:r>
+              <a:rPr lang="en-US" sz="2400" b="1" dirty="0" smtClean="0"/>
+              <a:t>………..</a:t>
+            </a:r>
+          </a:p>
+          <a:p>
+            <a:r>
+              <a:rPr lang="en-US" sz="2400" b="1" dirty="0" smtClean="0"/>
+              <a:t>………..</a:t>
+            </a:r>
+          </a:p>
+          <a:p>
+            <a:r>
+              <a:rPr lang="en-US" sz="2400" b="1" dirty="0" smtClean="0"/>
+              <a:t>func1(x, y, ….)</a:t>
+            </a:r>
+            <a:endParaRPr lang="en-IN" sz="2400" b="1" dirty="0"/>
+          </a:p>
+        </p:txBody>
+      </p:sp>
+      <p:cxnSp>
+        <p:nvCxnSpPr>
+          <p:cNvPr id="6" name="Straight Arrow Connector 5"/>
+          <p:cNvCxnSpPr/>
+          <p:nvPr/>
+        </p:nvCxnSpPr>
+        <p:spPr>
+          <a:xfrm>
+            <a:off x="2826327" y="2216727"/>
+            <a:ext cx="1219200" cy="2743200"/>
+          </a:xfrm>
+          <a:prstGeom prst="straightConnector1">
+            <a:avLst/>
+          </a:prstGeom>
+          <a:ln w="28575">
+            <a:tailEnd type="triangle"/>
+          </a:ln>
+        </p:spPr>
+        <p:style>
+          <a:lnRef idx="1">
+            <a:schemeClr val="accent1"/>
+          </a:lnRef>
+          <a:fillRef idx="0">
+            <a:schemeClr val="accent1"/>
+          </a:fillRef>
+          <a:effectRef idx="0">
+            <a:schemeClr val="accent1"/>
+          </a:effectRef>
+          <a:fontRef idx="minor">
+            <a:schemeClr val="tx1"/>
+          </a:fontRef>
+        </p:style>
+      </p:cxnSp>
+      <p:cxnSp>
+        <p:nvCxnSpPr>
+          <p:cNvPr id="9" name="Straight Arrow Connector 8"/>
+          <p:cNvCxnSpPr/>
+          <p:nvPr/>
+        </p:nvCxnSpPr>
+        <p:spPr>
+          <a:xfrm flipH="1">
+            <a:off x="4281055" y="4184073"/>
+            <a:ext cx="5112327" cy="775854"/>
+          </a:xfrm>
+          <a:prstGeom prst="straightConnector1">
+            <a:avLst/>
+          </a:prstGeom>
+          <a:ln w="28575">
+            <a:tailEnd type="triangle"/>
+          </a:ln>
+        </p:spPr>
+        <p:style>
+          <a:lnRef idx="1">
+            <a:schemeClr val="accent1"/>
+          </a:lnRef>
+          <a:fillRef idx="0">
+            <a:schemeClr val="accent1"/>
+          </a:fillRef>
+          <a:effectRef idx="0">
+            <a:schemeClr val="accent1"/>
+          </a:effectRef>
+          <a:fontRef idx="minor">
+            <a:schemeClr val="tx1"/>
+          </a:fontRef>
+        </p:style>
+      </p:cxnSp>
+      <p:sp>
+        <p:nvSpPr>
+          <p:cNvPr id="10" name="Rectangle 9"/>
+          <p:cNvSpPr/>
+          <p:nvPr/>
+        </p:nvSpPr>
+        <p:spPr>
+          <a:xfrm>
+            <a:off x="3352800" y="4959927"/>
+            <a:ext cx="1593273" cy="471055"/>
+          </a:xfrm>
+          <a:prstGeom prst="rect">
+            <a:avLst/>
+          </a:prstGeom>
+        </p:spPr>
+        <p:style>
+          <a:lnRef idx="2">
+            <a:schemeClr val="accent1">
+              <a:shade val="50000"/>
+            </a:schemeClr>
+          </a:lnRef>
+          <a:fillRef idx="1">
+            <a:schemeClr val="accent1"/>
+          </a:fillRef>
+          <a:effectRef idx="0">
+            <a:schemeClr val="accent1"/>
+          </a:effectRef>
+          <a:fontRef idx="minor">
+            <a:schemeClr val="lt1"/>
+          </a:fontRef>
+        </p:style>
+        <p:txBody>
+          <a:bodyPr rtlCol="0" anchor="ctr"/>
+          <a:lstStyle/>
+          <a:p>
+            <a:pPr algn="ctr"/>
+            <a:r>
+              <a:rPr lang="en-US" dirty="0" smtClean="0"/>
+              <a:t>memory</a:t>
+            </a:r>
+            <a:endParaRPr lang="en-IN" dirty="0"/>
+          </a:p>
+        </p:txBody>
+      </p:sp>
+    </p:spTree>
+    <p:extLst>
+      <p:ext uri="{BB962C8B-B14F-4D97-AF65-F5344CB8AC3E}">
+        <p14:creationId xmlns:p14="http://schemas.microsoft.com/office/powerpoint/2010/main" val="51431514"/>
+      </p:ext>
+    </p:extLst>
+  </p:cSld>
+  <p:clrMapOvr>
+    <a:masterClrMapping/>
+  </p:clrMapOvr>
+  <p:timing>
+    <p:tnLst>
+      <p:par>
+        <p:cTn id="1" dur="indefinite" restart="never" nodeType="tmRoot"/>
+      </p:par>
+    </p:tnLst>
+  </p:timing>
+</p:sld>
+</file>
+
+<file path=ppt/slides/slide12.xml><?xml version="1.0" encoding="utf-8"?>
+<p:sld xmlns:a="http://schemas.openxmlformats.org/drawingml/2006/main" xmlns:r="http://schemas.openxmlformats.org/officeDocument/2006/relationships" xmlns:p="http://schemas.openxmlformats.org/presentationml/2006/main">
+  <p:cSld>
+    <p:spTree>
+      <p:nvGrpSpPr>
+        <p:cNvPr id="1" name=""/>
+        <p:cNvGrpSpPr/>
+        <p:nvPr/>
+      </p:nvGrpSpPr>
+      <p:grpSpPr>
+        <a:xfrm>
+          <a:off x="0" y="0"/>
+          <a:ext cx="0" cy="0"/>
+          <a:chOff x="0" y="0"/>
+          <a:chExt cx="0" cy="0"/>
+        </a:xfrm>
+      </p:grpSpPr>
+      <p:sp>
+        <p:nvSpPr>
+          <p:cNvPr id="2" name="Title 1"/>
+          <p:cNvSpPr>
+            <a:spLocks noGrp="1"/>
+          </p:cNvSpPr>
+          <p:nvPr>
+            <p:ph type="title"/>
+          </p:nvPr>
+        </p:nvSpPr>
+        <p:spPr>
+          <a:xfrm>
+            <a:off x="646111" y="452718"/>
+            <a:ext cx="10035744" cy="1400530"/>
+          </a:xfrm>
+        </p:spPr>
+        <p:txBody>
+          <a:bodyPr/>
+          <a:lstStyle/>
+          <a:p>
+            <a:r>
+              <a:rPr lang="en-US" dirty="0" smtClean="0"/>
+              <a:t>Pass by reference - immutable</a:t>
+            </a:r>
+            <a:endParaRPr lang="en-IN" dirty="0"/>
+          </a:p>
+        </p:txBody>
+      </p:sp>
+      <p:sp>
+        <p:nvSpPr>
+          <p:cNvPr id="4" name="Rectangle 3"/>
+          <p:cNvSpPr/>
+          <p:nvPr/>
+        </p:nvSpPr>
+        <p:spPr>
+          <a:xfrm>
+            <a:off x="928255" y="1853248"/>
+            <a:ext cx="4128654" cy="2123007"/>
+          </a:xfrm>
+          <a:prstGeom prst="rect">
+            <a:avLst/>
+          </a:prstGeom>
+          <a:solidFill>
+            <a:srgbClr val="0070C0"/>
+          </a:solidFill>
+        </p:spPr>
+        <p:style>
+          <a:lnRef idx="2">
+            <a:schemeClr val="accent1">
+              <a:shade val="50000"/>
+            </a:schemeClr>
+          </a:lnRef>
+          <a:fillRef idx="1">
+            <a:schemeClr val="accent1"/>
+          </a:fillRef>
+          <a:effectRef idx="0">
+            <a:schemeClr val="accent1"/>
+          </a:effectRef>
+          <a:fontRef idx="minor">
+            <a:schemeClr val="lt1"/>
+          </a:fontRef>
+        </p:style>
+        <p:txBody>
+          <a:bodyPr rtlCol="0" anchor="t"/>
+          <a:lstStyle/>
+          <a:p>
+            <a:r>
+              <a:rPr lang="en-US" sz="2400" b="1" dirty="0" err="1">
+                <a:solidFill>
+                  <a:srgbClr val="FFFF00"/>
+                </a:solidFill>
+              </a:rPr>
+              <a:t>d</a:t>
+            </a:r>
+            <a:r>
+              <a:rPr lang="en-US" sz="2400" b="1" dirty="0" err="1" smtClean="0">
+                <a:solidFill>
+                  <a:srgbClr val="FFFF00"/>
+                </a:solidFill>
+              </a:rPr>
+              <a:t>ef</a:t>
+            </a:r>
+            <a:r>
+              <a:rPr lang="en-US" sz="2400" b="1" dirty="0" smtClean="0">
+                <a:solidFill>
+                  <a:srgbClr val="FFFF00"/>
+                </a:solidFill>
+              </a:rPr>
+              <a:t> func1(arg1, arg2, ….)</a:t>
+            </a:r>
+          </a:p>
+          <a:p>
+            <a:r>
+              <a:rPr lang="en-US" sz="2400" b="1" dirty="0" smtClean="0">
+                <a:solidFill>
+                  <a:srgbClr val="FFFF00"/>
+                </a:solidFill>
+              </a:rPr>
+              <a:t>	……..</a:t>
+            </a:r>
+          </a:p>
+          <a:p>
+            <a:r>
+              <a:rPr lang="en-US" sz="2400" b="1" dirty="0" smtClean="0">
+                <a:solidFill>
+                  <a:srgbClr val="FFFF00"/>
+                </a:solidFill>
+              </a:rPr>
+              <a:t>	……..</a:t>
+            </a:r>
+            <a:endParaRPr lang="en-IN" sz="2400" b="1" dirty="0">
+              <a:solidFill>
+                <a:srgbClr val="FFFF00"/>
+              </a:solidFill>
+            </a:endParaRPr>
+          </a:p>
+        </p:txBody>
+      </p:sp>
+      <p:sp>
+        <p:nvSpPr>
+          <p:cNvPr id="5" name="Rectangle 4"/>
+          <p:cNvSpPr/>
+          <p:nvPr/>
+        </p:nvSpPr>
+        <p:spPr>
+          <a:xfrm>
+            <a:off x="8298873" y="1853248"/>
+            <a:ext cx="2895600" cy="3685309"/>
+          </a:xfrm>
+          <a:prstGeom prst="rect">
+            <a:avLst/>
+          </a:prstGeom>
+          <a:solidFill>
+            <a:srgbClr val="00B0F0"/>
+          </a:solidFill>
+        </p:spPr>
+        <p:style>
+          <a:lnRef idx="2">
+            <a:schemeClr val="accent1">
+              <a:shade val="50000"/>
+            </a:schemeClr>
+          </a:lnRef>
+          <a:fillRef idx="1">
+            <a:schemeClr val="accent1"/>
+          </a:fillRef>
+          <a:effectRef idx="0">
+            <a:schemeClr val="accent1"/>
+          </a:effectRef>
+          <a:fontRef idx="minor">
+            <a:schemeClr val="lt1"/>
+          </a:fontRef>
+        </p:style>
+        <p:txBody>
+          <a:bodyPr rtlCol="0" anchor="ctr"/>
+          <a:lstStyle/>
+          <a:p>
+            <a:r>
+              <a:rPr lang="en-US" sz="2400" b="1" dirty="0" smtClean="0"/>
+              <a:t>………..</a:t>
+            </a:r>
+          </a:p>
+          <a:p>
+            <a:r>
+              <a:rPr lang="en-US" sz="2400" b="1" dirty="0" smtClean="0"/>
+              <a:t>………..</a:t>
+            </a:r>
+          </a:p>
+          <a:p>
+            <a:r>
+              <a:rPr lang="en-US" sz="2400" b="1" dirty="0" smtClean="0"/>
+              <a:t>func1(x, y, ….)</a:t>
+            </a:r>
+            <a:endParaRPr lang="en-IN" sz="2400" b="1" dirty="0"/>
+          </a:p>
+        </p:txBody>
+      </p:sp>
+      <p:cxnSp>
+        <p:nvCxnSpPr>
+          <p:cNvPr id="6" name="Straight Arrow Connector 5"/>
+          <p:cNvCxnSpPr/>
+          <p:nvPr/>
+        </p:nvCxnSpPr>
+        <p:spPr>
+          <a:xfrm>
+            <a:off x="2826327" y="2216727"/>
+            <a:ext cx="1219200" cy="2743200"/>
+          </a:xfrm>
+          <a:prstGeom prst="straightConnector1">
+            <a:avLst/>
+          </a:prstGeom>
+          <a:ln w="28575">
+            <a:tailEnd type="triangle"/>
+          </a:ln>
+        </p:spPr>
+        <p:style>
+          <a:lnRef idx="1">
+            <a:schemeClr val="accent1"/>
+          </a:lnRef>
+          <a:fillRef idx="0">
+            <a:schemeClr val="accent1"/>
+          </a:fillRef>
+          <a:effectRef idx="0">
+            <a:schemeClr val="accent1"/>
+          </a:effectRef>
+          <a:fontRef idx="minor">
+            <a:schemeClr val="tx1"/>
+          </a:fontRef>
+        </p:style>
+      </p:cxnSp>
+      <p:cxnSp>
+        <p:nvCxnSpPr>
+          <p:cNvPr id="9" name="Straight Arrow Connector 8"/>
+          <p:cNvCxnSpPr/>
+          <p:nvPr/>
+        </p:nvCxnSpPr>
+        <p:spPr>
+          <a:xfrm flipH="1">
+            <a:off x="4281055" y="4184073"/>
+            <a:ext cx="5112327" cy="775854"/>
+          </a:xfrm>
+          <a:prstGeom prst="straightConnector1">
+            <a:avLst/>
+          </a:prstGeom>
+          <a:ln w="28575">
+            <a:tailEnd type="triangle"/>
+          </a:ln>
+        </p:spPr>
+        <p:style>
+          <a:lnRef idx="1">
+            <a:schemeClr val="accent1"/>
+          </a:lnRef>
+          <a:fillRef idx="0">
+            <a:schemeClr val="accent1"/>
+          </a:fillRef>
+          <a:effectRef idx="0">
+            <a:schemeClr val="accent1"/>
+          </a:effectRef>
+          <a:fontRef idx="minor">
+            <a:schemeClr val="tx1"/>
+          </a:fontRef>
+        </p:style>
+      </p:cxnSp>
+      <p:sp>
+        <p:nvSpPr>
+          <p:cNvPr id="10" name="Rectangle 9"/>
+          <p:cNvSpPr/>
+          <p:nvPr/>
+        </p:nvSpPr>
+        <p:spPr>
+          <a:xfrm>
+            <a:off x="3352800" y="4959927"/>
+            <a:ext cx="1593273" cy="471055"/>
+          </a:xfrm>
+          <a:prstGeom prst="rect">
+            <a:avLst/>
+          </a:prstGeom>
+        </p:spPr>
+        <p:style>
+          <a:lnRef idx="2">
+            <a:schemeClr val="accent1">
+              <a:shade val="50000"/>
+            </a:schemeClr>
+          </a:lnRef>
+          <a:fillRef idx="1">
+            <a:schemeClr val="accent1"/>
+          </a:fillRef>
+          <a:effectRef idx="0">
+            <a:schemeClr val="accent1"/>
+          </a:effectRef>
+          <a:fontRef idx="minor">
+            <a:schemeClr val="lt1"/>
+          </a:fontRef>
+        </p:style>
+        <p:txBody>
+          <a:bodyPr rtlCol="0" anchor="ctr"/>
+          <a:lstStyle/>
+          <a:p>
+            <a:pPr algn="ctr"/>
+            <a:r>
+              <a:rPr lang="en-US" dirty="0" smtClean="0"/>
+              <a:t>memory</a:t>
+            </a:r>
+            <a:endParaRPr lang="en-IN" dirty="0"/>
+          </a:p>
+        </p:txBody>
+      </p:sp>
+      <p:cxnSp>
+        <p:nvCxnSpPr>
+          <p:cNvPr id="8" name="Straight Arrow Connector 7"/>
+          <p:cNvCxnSpPr/>
+          <p:nvPr/>
+        </p:nvCxnSpPr>
+        <p:spPr>
+          <a:xfrm flipH="1">
+            <a:off x="1385455" y="2914751"/>
+            <a:ext cx="484909" cy="2045176"/>
+          </a:xfrm>
+          <a:prstGeom prst="straightConnector1">
+            <a:avLst/>
+          </a:prstGeom>
+          <a:ln w="28575">
+            <a:tailEnd type="triangle"/>
+          </a:ln>
+        </p:spPr>
+        <p:style>
+          <a:lnRef idx="1">
+            <a:schemeClr val="accent1"/>
+          </a:lnRef>
+          <a:fillRef idx="0">
+            <a:schemeClr val="accent1"/>
+          </a:fillRef>
+          <a:effectRef idx="0">
+            <a:schemeClr val="accent1"/>
+          </a:effectRef>
+          <a:fontRef idx="minor">
+            <a:schemeClr val="tx1"/>
+          </a:fontRef>
+        </p:style>
+      </p:cxnSp>
+      <p:sp>
+        <p:nvSpPr>
+          <p:cNvPr id="11" name="Rectangle 10"/>
+          <p:cNvSpPr/>
+          <p:nvPr/>
+        </p:nvSpPr>
+        <p:spPr>
+          <a:xfrm>
+            <a:off x="588818" y="4949333"/>
+            <a:ext cx="1593273" cy="471055"/>
+          </a:xfrm>
+          <a:prstGeom prst="rect">
+            <a:avLst/>
+          </a:prstGeom>
+        </p:spPr>
+        <p:style>
+          <a:lnRef idx="2">
+            <a:schemeClr val="accent1">
+              <a:shade val="50000"/>
+            </a:schemeClr>
+          </a:lnRef>
+          <a:fillRef idx="1">
+            <a:schemeClr val="accent1"/>
+          </a:fillRef>
+          <a:effectRef idx="0">
+            <a:schemeClr val="accent1"/>
+          </a:effectRef>
+          <a:fontRef idx="minor">
+            <a:schemeClr val="lt1"/>
+          </a:fontRef>
+        </p:style>
+        <p:txBody>
+          <a:bodyPr rtlCol="0" anchor="ctr"/>
+          <a:lstStyle/>
+          <a:p>
+            <a:pPr algn="ctr"/>
+            <a:r>
+              <a:rPr lang="en-US" dirty="0" smtClean="0"/>
+              <a:t>memory_2</a:t>
+            </a:r>
+            <a:endParaRPr lang="en-IN" dirty="0"/>
+          </a:p>
+        </p:txBody>
+      </p:sp>
+      <p:sp>
+        <p:nvSpPr>
+          <p:cNvPr id="7" name="TextBox 6"/>
+          <p:cNvSpPr txBox="1"/>
+          <p:nvPr/>
+        </p:nvSpPr>
+        <p:spPr>
+          <a:xfrm>
+            <a:off x="677696" y="4278128"/>
+            <a:ext cx="1670650" cy="369332"/>
+          </a:xfrm>
+          <a:prstGeom prst="rect">
+            <a:avLst/>
+          </a:prstGeom>
+          <a:noFill/>
+        </p:spPr>
+        <p:txBody>
+          <a:bodyPr wrap="none" rtlCol="0">
+            <a:spAutoFit/>
+          </a:bodyPr>
+          <a:lstStyle/>
+          <a:p>
+            <a:r>
+              <a:rPr lang="en-US" dirty="0" smtClean="0"/>
+              <a:t>reassignment</a:t>
+            </a:r>
+            <a:endParaRPr lang="en-IN" dirty="0"/>
+          </a:p>
+        </p:txBody>
+      </p:sp>
+    </p:spTree>
+    <p:extLst>
+      <p:ext uri="{BB962C8B-B14F-4D97-AF65-F5344CB8AC3E}">
+        <p14:creationId xmlns:p14="http://schemas.microsoft.com/office/powerpoint/2010/main" val="3242878642"/>
+      </p:ext>
+    </p:extLst>
+  </p:cSld>
+  <p:clrMapOvr>
+    <a:masterClrMapping/>
+  </p:clrMapOvr>
+  <p:timing>
+    <p:tnLst>
+      <p:par>
+        <p:cTn id="1" dur="indefinite" restart="never" nodeType="tmRoot"/>
+      </p:par>
+    </p:tnLst>
+  </p:timing>
+</p:sld>
+</file>
+
+<file path=ppt/slides/slide13.xml><?xml version="1.0" encoding="utf-8"?>
+<p:sld xmlns:a="http://schemas.openxmlformats.org/drawingml/2006/main" xmlns:r="http://schemas.openxmlformats.org/officeDocument/2006/relationships" xmlns:p="http://schemas.openxmlformats.org/presentationml/2006/main">
+  <p:cSld>
+    <p:spTree>
+      <p:nvGrpSpPr>
+        <p:cNvPr id="1" name=""/>
+        <p:cNvGrpSpPr/>
+        <p:nvPr/>
+      </p:nvGrpSpPr>
+      <p:grpSpPr>
+        <a:xfrm>
+          <a:off x="0" y="0"/>
+          <a:ext cx="0" cy="0"/>
+          <a:chOff x="0" y="0"/>
+          <a:chExt cx="0" cy="0"/>
+        </a:xfrm>
+      </p:grpSpPr>
+      <p:sp>
+        <p:nvSpPr>
+          <p:cNvPr id="2" name="Title 1"/>
+          <p:cNvSpPr>
+            <a:spLocks noGrp="1"/>
+          </p:cNvSpPr>
+          <p:nvPr>
+            <p:ph type="title"/>
+          </p:nvPr>
+        </p:nvSpPr>
+        <p:spPr>
+          <a:xfrm>
+            <a:off x="646111" y="452718"/>
+            <a:ext cx="10035744" cy="1400530"/>
+          </a:xfrm>
+        </p:spPr>
+        <p:txBody>
+          <a:bodyPr/>
+          <a:lstStyle/>
+          <a:p>
+            <a:r>
+              <a:rPr lang="en-US" dirty="0" smtClean="0"/>
+              <a:t>Pass by reference - mutable</a:t>
+            </a:r>
+            <a:endParaRPr lang="en-IN" dirty="0"/>
+          </a:p>
+        </p:txBody>
+      </p:sp>
+      <p:sp>
+        <p:nvSpPr>
+          <p:cNvPr id="4" name="Rectangle 3"/>
+          <p:cNvSpPr/>
+          <p:nvPr/>
+        </p:nvSpPr>
+        <p:spPr>
+          <a:xfrm>
+            <a:off x="928255" y="1853248"/>
+            <a:ext cx="4128654" cy="2123007"/>
+          </a:xfrm>
+          <a:prstGeom prst="rect">
+            <a:avLst/>
+          </a:prstGeom>
+          <a:solidFill>
+            <a:srgbClr val="0070C0"/>
+          </a:solidFill>
+        </p:spPr>
+        <p:style>
+          <a:lnRef idx="2">
+            <a:schemeClr val="accent1">
+              <a:shade val="50000"/>
+            </a:schemeClr>
+          </a:lnRef>
+          <a:fillRef idx="1">
+            <a:schemeClr val="accent1"/>
+          </a:fillRef>
+          <a:effectRef idx="0">
+            <a:schemeClr val="accent1"/>
+          </a:effectRef>
+          <a:fontRef idx="minor">
+            <a:schemeClr val="lt1"/>
+          </a:fontRef>
+        </p:style>
+        <p:txBody>
+          <a:bodyPr rtlCol="0" anchor="t"/>
+          <a:lstStyle/>
+          <a:p>
+            <a:r>
+              <a:rPr lang="en-US" sz="2400" b="1" dirty="0" err="1">
+                <a:solidFill>
+                  <a:srgbClr val="FFFF00"/>
+                </a:solidFill>
+              </a:rPr>
+              <a:t>d</a:t>
+            </a:r>
+            <a:r>
+              <a:rPr lang="en-US" sz="2400" b="1" dirty="0" err="1" smtClean="0">
+                <a:solidFill>
+                  <a:srgbClr val="FFFF00"/>
+                </a:solidFill>
+              </a:rPr>
+              <a:t>ef</a:t>
+            </a:r>
+            <a:r>
+              <a:rPr lang="en-US" sz="2400" b="1" dirty="0" smtClean="0">
+                <a:solidFill>
+                  <a:srgbClr val="FFFF00"/>
+                </a:solidFill>
+              </a:rPr>
+              <a:t> func1(arg1, arg2, ….)</a:t>
+            </a:r>
+          </a:p>
+          <a:p>
+            <a:r>
+              <a:rPr lang="en-US" sz="2400" b="1" dirty="0" smtClean="0">
+                <a:solidFill>
+                  <a:srgbClr val="FFFF00"/>
+                </a:solidFill>
+              </a:rPr>
+              <a:t>	……..</a:t>
+            </a:r>
+          </a:p>
+          <a:p>
+            <a:r>
+              <a:rPr lang="en-US" sz="2400" b="1" dirty="0" smtClean="0">
+                <a:solidFill>
+                  <a:srgbClr val="FFFF00"/>
+                </a:solidFill>
+              </a:rPr>
+              <a:t>	……..</a:t>
+            </a:r>
+            <a:endParaRPr lang="en-IN" sz="2400" b="1" dirty="0">
+              <a:solidFill>
+                <a:srgbClr val="FFFF00"/>
+              </a:solidFill>
+            </a:endParaRPr>
+          </a:p>
+        </p:txBody>
+      </p:sp>
+      <p:sp>
+        <p:nvSpPr>
+          <p:cNvPr id="5" name="Rectangle 4"/>
+          <p:cNvSpPr/>
+          <p:nvPr/>
+        </p:nvSpPr>
+        <p:spPr>
+          <a:xfrm>
+            <a:off x="8298873" y="1853248"/>
+            <a:ext cx="2895600" cy="3685309"/>
+          </a:xfrm>
+          <a:prstGeom prst="rect">
+            <a:avLst/>
+          </a:prstGeom>
+          <a:solidFill>
+            <a:srgbClr val="00B0F0"/>
+          </a:solidFill>
+        </p:spPr>
+        <p:style>
+          <a:lnRef idx="2">
+            <a:schemeClr val="accent1">
+              <a:shade val="50000"/>
+            </a:schemeClr>
+          </a:lnRef>
+          <a:fillRef idx="1">
+            <a:schemeClr val="accent1"/>
+          </a:fillRef>
+          <a:effectRef idx="0">
+            <a:schemeClr val="accent1"/>
+          </a:effectRef>
+          <a:fontRef idx="minor">
+            <a:schemeClr val="lt1"/>
+          </a:fontRef>
+        </p:style>
+        <p:txBody>
+          <a:bodyPr rtlCol="0" anchor="ctr"/>
+          <a:lstStyle/>
+          <a:p>
+            <a:r>
+              <a:rPr lang="en-US" sz="2400" b="1" dirty="0" smtClean="0"/>
+              <a:t>………..</a:t>
+            </a:r>
+          </a:p>
+          <a:p>
+            <a:r>
+              <a:rPr lang="en-US" sz="2400" b="1" dirty="0" smtClean="0"/>
+              <a:t>………..</a:t>
+            </a:r>
+          </a:p>
+          <a:p>
+            <a:r>
+              <a:rPr lang="en-US" sz="2400" b="1" dirty="0" smtClean="0"/>
+              <a:t>func1(x, y, ….)</a:t>
+            </a:r>
+            <a:endParaRPr lang="en-IN" sz="2400" b="1" dirty="0"/>
+          </a:p>
+        </p:txBody>
+      </p:sp>
+      <p:cxnSp>
+        <p:nvCxnSpPr>
+          <p:cNvPr id="6" name="Straight Arrow Connector 5"/>
+          <p:cNvCxnSpPr/>
+          <p:nvPr/>
+        </p:nvCxnSpPr>
+        <p:spPr>
+          <a:xfrm>
+            <a:off x="2826327" y="2216727"/>
+            <a:ext cx="1219200" cy="2743200"/>
+          </a:xfrm>
+          <a:prstGeom prst="straightConnector1">
+            <a:avLst/>
+          </a:prstGeom>
+          <a:ln w="28575">
+            <a:tailEnd type="triangle"/>
+          </a:ln>
+        </p:spPr>
+        <p:style>
+          <a:lnRef idx="1">
+            <a:schemeClr val="accent1"/>
+          </a:lnRef>
+          <a:fillRef idx="0">
+            <a:schemeClr val="accent1"/>
+          </a:fillRef>
+          <a:effectRef idx="0">
+            <a:schemeClr val="accent1"/>
+          </a:effectRef>
+          <a:fontRef idx="minor">
+            <a:schemeClr val="tx1"/>
+          </a:fontRef>
+        </p:style>
+      </p:cxnSp>
+      <p:cxnSp>
+        <p:nvCxnSpPr>
+          <p:cNvPr id="9" name="Straight Arrow Connector 8"/>
+          <p:cNvCxnSpPr/>
+          <p:nvPr/>
+        </p:nvCxnSpPr>
+        <p:spPr>
+          <a:xfrm flipH="1">
+            <a:off x="4281055" y="4184073"/>
+            <a:ext cx="5112327" cy="775854"/>
+          </a:xfrm>
+          <a:prstGeom prst="straightConnector1">
+            <a:avLst/>
+          </a:prstGeom>
+          <a:ln w="28575">
+            <a:tailEnd type="triangle"/>
+          </a:ln>
+        </p:spPr>
+        <p:style>
+          <a:lnRef idx="1">
+            <a:schemeClr val="accent1"/>
+          </a:lnRef>
+          <a:fillRef idx="0">
+            <a:schemeClr val="accent1"/>
+          </a:fillRef>
+          <a:effectRef idx="0">
+            <a:schemeClr val="accent1"/>
+          </a:effectRef>
+          <a:fontRef idx="minor">
+            <a:schemeClr val="tx1"/>
+          </a:fontRef>
+        </p:style>
+      </p:cxnSp>
+      <p:sp>
+        <p:nvSpPr>
+          <p:cNvPr id="10" name="Rectangle 9"/>
+          <p:cNvSpPr/>
+          <p:nvPr/>
+        </p:nvSpPr>
+        <p:spPr>
+          <a:xfrm>
+            <a:off x="3352800" y="4959927"/>
+            <a:ext cx="1593273" cy="471055"/>
+          </a:xfrm>
+          <a:prstGeom prst="rect">
+            <a:avLst/>
+          </a:prstGeom>
+        </p:spPr>
+        <p:style>
+          <a:lnRef idx="2">
+            <a:schemeClr val="accent1">
+              <a:shade val="50000"/>
+            </a:schemeClr>
+          </a:lnRef>
+          <a:fillRef idx="1">
+            <a:schemeClr val="accent1"/>
+          </a:fillRef>
+          <a:effectRef idx="0">
+            <a:schemeClr val="accent1"/>
+          </a:effectRef>
+          <a:fontRef idx="minor">
+            <a:schemeClr val="lt1"/>
+          </a:fontRef>
+        </p:style>
+        <p:txBody>
+          <a:bodyPr rtlCol="0" anchor="ctr"/>
+          <a:lstStyle/>
+          <a:p>
+            <a:pPr algn="ctr"/>
+            <a:r>
+              <a:rPr lang="en-US" dirty="0" smtClean="0"/>
+              <a:t>memory</a:t>
+            </a:r>
+            <a:endParaRPr lang="en-IN" dirty="0"/>
+          </a:p>
+        </p:txBody>
+      </p:sp>
+      <p:cxnSp>
+        <p:nvCxnSpPr>
+          <p:cNvPr id="8" name="Straight Arrow Connector 7"/>
+          <p:cNvCxnSpPr/>
+          <p:nvPr/>
+        </p:nvCxnSpPr>
+        <p:spPr>
+          <a:xfrm flipH="1">
+            <a:off x="1385455" y="2914751"/>
+            <a:ext cx="484909" cy="2045176"/>
+          </a:xfrm>
+          <a:prstGeom prst="straightConnector1">
+            <a:avLst/>
+          </a:prstGeom>
+          <a:ln w="28575">
+            <a:tailEnd type="triangle"/>
+          </a:ln>
+        </p:spPr>
+        <p:style>
+          <a:lnRef idx="1">
+            <a:schemeClr val="accent1"/>
+          </a:lnRef>
+          <a:fillRef idx="0">
+            <a:schemeClr val="accent1"/>
+          </a:fillRef>
+          <a:effectRef idx="0">
+            <a:schemeClr val="accent1"/>
+          </a:effectRef>
+          <a:fontRef idx="minor">
+            <a:schemeClr val="tx1"/>
+          </a:fontRef>
+        </p:style>
+      </p:cxnSp>
+      <p:sp>
+        <p:nvSpPr>
+          <p:cNvPr id="11" name="Rectangle 10"/>
+          <p:cNvSpPr/>
+          <p:nvPr/>
+        </p:nvSpPr>
+        <p:spPr>
+          <a:xfrm>
+            <a:off x="588818" y="4949333"/>
+            <a:ext cx="1593273" cy="471055"/>
+          </a:xfrm>
+          <a:prstGeom prst="rect">
+            <a:avLst/>
+          </a:prstGeom>
+        </p:spPr>
+        <p:style>
+          <a:lnRef idx="2">
+            <a:schemeClr val="accent1">
+              <a:shade val="50000"/>
+            </a:schemeClr>
+          </a:lnRef>
+          <a:fillRef idx="1">
+            <a:schemeClr val="accent1"/>
+          </a:fillRef>
+          <a:effectRef idx="0">
+            <a:schemeClr val="accent1"/>
+          </a:effectRef>
+          <a:fontRef idx="minor">
+            <a:schemeClr val="lt1"/>
+          </a:fontRef>
+        </p:style>
+        <p:txBody>
+          <a:bodyPr rtlCol="0" anchor="ctr"/>
+          <a:lstStyle/>
+          <a:p>
+            <a:pPr algn="ctr"/>
+            <a:r>
+              <a:rPr lang="en-US" dirty="0" smtClean="0"/>
+              <a:t>memory_2</a:t>
+            </a:r>
+            <a:endParaRPr lang="en-IN" dirty="0"/>
+          </a:p>
+        </p:txBody>
+      </p:sp>
+      <p:sp>
+        <p:nvSpPr>
+          <p:cNvPr id="7" name="TextBox 6"/>
+          <p:cNvSpPr txBox="1"/>
+          <p:nvPr/>
+        </p:nvSpPr>
+        <p:spPr>
+          <a:xfrm>
+            <a:off x="833559" y="4237176"/>
+            <a:ext cx="1670650" cy="369332"/>
+          </a:xfrm>
+          <a:prstGeom prst="rect">
+            <a:avLst/>
+          </a:prstGeom>
+          <a:noFill/>
+        </p:spPr>
+        <p:txBody>
+          <a:bodyPr wrap="none" rtlCol="0">
+            <a:spAutoFit/>
+          </a:bodyPr>
+          <a:lstStyle/>
+          <a:p>
+            <a:r>
+              <a:rPr lang="en-US" dirty="0" smtClean="0"/>
+              <a:t>r</a:t>
+            </a:r>
+            <a:r>
+              <a:rPr lang="en-US" dirty="0" smtClean="0"/>
+              <a:t>eassignment</a:t>
+            </a:r>
+          </a:p>
+        </p:txBody>
+      </p:sp>
+      <p:cxnSp>
+        <p:nvCxnSpPr>
+          <p:cNvPr id="12" name="Straight Arrow Connector 11"/>
+          <p:cNvCxnSpPr/>
+          <p:nvPr/>
+        </p:nvCxnSpPr>
+        <p:spPr>
+          <a:xfrm>
+            <a:off x="1870364" y="2914751"/>
+            <a:ext cx="2027165" cy="2034582"/>
+          </a:xfrm>
+          <a:prstGeom prst="straightConnector1">
+            <a:avLst/>
+          </a:prstGeom>
+          <a:ln w="28575">
+            <a:tailEnd type="triangle"/>
+          </a:ln>
+        </p:spPr>
+        <p:style>
+          <a:lnRef idx="1">
+            <a:schemeClr val="accent1"/>
+          </a:lnRef>
+          <a:fillRef idx="0">
+            <a:schemeClr val="accent1"/>
+          </a:fillRef>
+          <a:effectRef idx="0">
+            <a:schemeClr val="accent1"/>
+          </a:effectRef>
+          <a:fontRef idx="minor">
+            <a:schemeClr val="tx1"/>
+          </a:fontRef>
+        </p:style>
+      </p:cxnSp>
+      <p:sp>
+        <p:nvSpPr>
+          <p:cNvPr id="13" name="TextBox 12"/>
+          <p:cNvSpPr txBox="1"/>
+          <p:nvPr/>
+        </p:nvSpPr>
+        <p:spPr>
+          <a:xfrm>
+            <a:off x="2590799" y="4027116"/>
+            <a:ext cx="1079142" cy="369332"/>
+          </a:xfrm>
+          <a:prstGeom prst="rect">
+            <a:avLst/>
+          </a:prstGeom>
+          <a:noFill/>
+        </p:spPr>
+        <p:txBody>
+          <a:bodyPr wrap="none" rtlCol="0">
+            <a:spAutoFit/>
+          </a:bodyPr>
+          <a:lstStyle/>
+          <a:p>
+            <a:r>
+              <a:rPr lang="en-US" dirty="0" smtClean="0"/>
+              <a:t>change</a:t>
+            </a:r>
+            <a:endParaRPr lang="en-IN" dirty="0"/>
+          </a:p>
+        </p:txBody>
+      </p:sp>
+    </p:spTree>
+    <p:extLst>
+      <p:ext uri="{BB962C8B-B14F-4D97-AF65-F5344CB8AC3E}">
+        <p14:creationId xmlns:p14="http://schemas.microsoft.com/office/powerpoint/2010/main" val="4086593037"/>
+      </p:ext>
+    </p:extLst>
+  </p:cSld>
+  <p:clrMapOvr>
+    <a:masterClrMapping/>
+  </p:clrMapOvr>
+  <p:timing>
+    <p:tnLst>
+      <p:par>
+        <p:cTn id="1" dur="indefinite" restart="never" nodeType="tmRoot"/>
+      </p:par>
+    </p:tnLst>
+  </p:timing>
+</p:sld>
+</file>
+
 <file path=ppt/slides/slide2.xml><?xml version="1.0" encoding="utf-8"?>
 <p:sld xmlns:a="http://schemas.openxmlformats.org/drawingml/2006/main" xmlns:r="http://schemas.openxmlformats.org/officeDocument/2006/relationships" xmlns:p="http://schemas.openxmlformats.org/presentationml/2006/main">
   <p:cSld>
@@ -7719,6 +9488,189 @@
     <p:extLst>
       <p:ext uri="{BB962C8B-B14F-4D97-AF65-F5344CB8AC3E}">
         <p14:creationId xmlns:p14="http://schemas.microsoft.com/office/powerpoint/2010/main" val="754228550"/>
+      </p:ext>
+    </p:extLst>
+  </p:cSld>
+  <p:clrMapOvr>
+    <a:masterClrMapping/>
+  </p:clrMapOvr>
+  <p:timing>
+    <p:tnLst>
+      <p:par>
+        <p:cTn id="1" dur="indefinite" restart="never" nodeType="tmRoot"/>
+      </p:par>
+    </p:tnLst>
+  </p:timing>
+</p:sld>
+</file>
+
+<file path=ppt/slides/slide9.xml><?xml version="1.0" encoding="utf-8"?>
+<p:sld xmlns:a="http://schemas.openxmlformats.org/drawingml/2006/main" xmlns:r="http://schemas.openxmlformats.org/officeDocument/2006/relationships" xmlns:p="http://schemas.openxmlformats.org/presentationml/2006/main">
+  <p:cSld>
+    <p:spTree>
+      <p:nvGrpSpPr>
+        <p:cNvPr id="1" name=""/>
+        <p:cNvGrpSpPr/>
+        <p:nvPr/>
+      </p:nvGrpSpPr>
+      <p:grpSpPr>
+        <a:xfrm>
+          <a:off x="0" y="0"/>
+          <a:ext cx="0" cy="0"/>
+          <a:chOff x="0" y="0"/>
+          <a:chExt cx="0" cy="0"/>
+        </a:xfrm>
+      </p:grpSpPr>
+      <p:sp>
+        <p:nvSpPr>
+          <p:cNvPr id="2" name="Title 1"/>
+          <p:cNvSpPr>
+            <a:spLocks noGrp="1"/>
+          </p:cNvSpPr>
+          <p:nvPr>
+            <p:ph type="title"/>
+          </p:nvPr>
+        </p:nvSpPr>
+        <p:spPr>
+          <a:xfrm>
+            <a:off x="646111" y="452718"/>
+            <a:ext cx="10035744" cy="1400530"/>
+          </a:xfrm>
+        </p:spPr>
+        <p:txBody>
+          <a:bodyPr/>
+          <a:lstStyle/>
+          <a:p>
+            <a:r>
+              <a:rPr lang="en-US" dirty="0" smtClean="0"/>
+              <a:t>Pass by reference and Pass by value</a:t>
+            </a:r>
+            <a:endParaRPr lang="en-IN" dirty="0"/>
+          </a:p>
+        </p:txBody>
+      </p:sp>
+      <p:sp>
+        <p:nvSpPr>
+          <p:cNvPr id="7" name="TextBox 6"/>
+          <p:cNvSpPr txBox="1"/>
+          <p:nvPr/>
+        </p:nvSpPr>
+        <p:spPr>
+          <a:xfrm>
+            <a:off x="646111" y="1853248"/>
+            <a:ext cx="11282653" cy="3539430"/>
+          </a:xfrm>
+          <a:prstGeom prst="rect">
+            <a:avLst/>
+          </a:prstGeom>
+          <a:noFill/>
+        </p:spPr>
+        <p:txBody>
+          <a:bodyPr wrap="square" rtlCol="0">
+            <a:spAutoFit/>
+          </a:bodyPr>
+          <a:lstStyle/>
+          <a:p>
+            <a:pPr marL="285750" indent="-285750">
+              <a:buFont typeface="Arial" panose="020B0604020202020204" pitchFamily="34" charset="0"/>
+              <a:buChar char="•"/>
+            </a:pPr>
+            <a:r>
+              <a:rPr lang="en-US" sz="3200" dirty="0" smtClean="0"/>
+              <a:t>Python uses pass by reference</a:t>
+            </a:r>
+          </a:p>
+          <a:p>
+            <a:pPr marL="285750" indent="-285750">
+              <a:buFont typeface="Arial" panose="020B0604020202020204" pitchFamily="34" charset="0"/>
+              <a:buChar char="•"/>
+            </a:pPr>
+            <a:endParaRPr lang="en-US" sz="3200" dirty="0"/>
+          </a:p>
+          <a:p>
+            <a:pPr marL="285750" indent="-285750">
+              <a:buFont typeface="Arial" panose="020B0604020202020204" pitchFamily="34" charset="0"/>
+              <a:buChar char="•"/>
+            </a:pPr>
+            <a:r>
+              <a:rPr lang="en-US" sz="3200" dirty="0" smtClean="0"/>
+              <a:t>Value of id() same for calling </a:t>
+            </a:r>
+            <a:r>
+              <a:rPr lang="en-US" sz="3200" dirty="0" err="1" smtClean="0"/>
+              <a:t>env</a:t>
+            </a:r>
+            <a:r>
+              <a:rPr lang="en-US" sz="3200" dirty="0" smtClean="0"/>
+              <a:t> and called function</a:t>
+            </a:r>
+          </a:p>
+          <a:p>
+            <a:pPr marL="285750" indent="-285750">
+              <a:buFont typeface="Arial" panose="020B0604020202020204" pitchFamily="34" charset="0"/>
+              <a:buChar char="•"/>
+            </a:pPr>
+            <a:endParaRPr lang="en-US" sz="3200" dirty="0"/>
+          </a:p>
+          <a:p>
+            <a:pPr marL="285750" indent="-285750">
+              <a:buFont typeface="Arial" panose="020B0604020202020204" pitchFamily="34" charset="0"/>
+              <a:buChar char="•"/>
+            </a:pPr>
+            <a:r>
+              <a:rPr lang="en-US" sz="3200" dirty="0" smtClean="0"/>
+              <a:t>If you </a:t>
+            </a:r>
+            <a:r>
+              <a:rPr lang="en-US" sz="3200" dirty="0" smtClean="0"/>
+              <a:t>modify th</a:t>
+            </a:r>
+            <a:r>
+              <a:rPr lang="en-US" sz="3200" dirty="0" smtClean="0"/>
+              <a:t>e object </a:t>
+            </a:r>
+            <a:r>
+              <a:rPr lang="en-US" sz="3200" dirty="0" smtClean="0"/>
+              <a:t>within </a:t>
+            </a:r>
+            <a:r>
+              <a:rPr lang="en-US" sz="3200" dirty="0" smtClean="0"/>
+              <a:t>a function, the change also reflects back in the calling </a:t>
+            </a:r>
+            <a:r>
+              <a:rPr lang="en-US" sz="3200" dirty="0" err="1" smtClean="0"/>
+              <a:t>env</a:t>
+            </a:r>
+            <a:r>
+              <a:rPr lang="en-US" sz="3200" dirty="0" smtClean="0"/>
+              <a:t>.</a:t>
+            </a:r>
+          </a:p>
+          <a:p>
+            <a:pPr marL="742950" lvl="1" indent="-285750">
+              <a:buFont typeface="Arial" panose="020B0604020202020204" pitchFamily="34" charset="0"/>
+              <a:buChar char="•"/>
+            </a:pPr>
+            <a:r>
+              <a:rPr lang="en-US" sz="3200" dirty="0"/>
+              <a:t>m</a:t>
+            </a:r>
+            <a:r>
+              <a:rPr lang="en-US" sz="3200" dirty="0" smtClean="0"/>
+              <a:t>odification is possible for list, set</a:t>
+            </a:r>
+            <a:r>
+              <a:rPr lang="en-US" sz="3200" smtClean="0"/>
+              <a:t>, etc.</a:t>
+            </a:r>
+            <a:endParaRPr lang="en-IN" sz="3200" dirty="0"/>
+          </a:p>
+        </p:txBody>
+      </p:sp>
+    </p:spTree>
+    <p:extLst>
+      <p:ext uri="{BB962C8B-B14F-4D97-AF65-F5344CB8AC3E}">
+        <p14:creationId xmlns:p14="http://schemas.microsoft.com/office/powerpoint/2010/main" val="3672905330"/>
       </p:ext>
     </p:extLst>
   </p:cSld>

</xml_diff>